<commit_message>
빌드 850864e0b22 버전  - 새 컨텐츠 표시 변경  - 카테고리 UI 개선  - 2021-09-15-increase-ubuntu-remote-security 작성
</commit_message>
<xml_diff>
--- a/사진.pptx
+++ b/사진.pptx
@@ -5,10 +5,11 @@
     <p:sldMasterId id="2147483648" r:id="rId1"/>
   </p:sldMasterIdLst>
   <p:notesMasterIdLst>
-    <p:notesMasterId r:id="rId3"/>
+    <p:notesMasterId r:id="rId4"/>
   </p:notesMasterIdLst>
   <p:sldIdLst>
     <p:sldId id="271" r:id="rId2"/>
+    <p:sldId id="272" r:id="rId3"/>
   </p:sldIdLst>
   <p:sldSz cx="12192000" cy="6858000"/>
   <p:notesSz cx="6858000" cy="9144000"/>
@@ -197,7 +198,7 @@
           <a:p>
             <a:fld id="{C4873304-7CC2-49A0-BE74-ACC0A9BBD974}" type="datetimeFigureOut">
               <a:rPr lang="ko-KR" altLang="en-US" smtClean="0"/>
-              <a:t>2021-09-13</a:t>
+              <a:t>2021-09-15</a:t>
             </a:fld>
             <a:endParaRPr lang="ko-KR" altLang="en-US"/>
           </a:p>
@@ -636,7 +637,7 @@
           <a:p>
             <a:fld id="{14627BA5-89F0-4976-B806-5D98EF5704F2}" type="datetimeFigureOut">
               <a:rPr lang="ko-KR" altLang="en-US" smtClean="0"/>
-              <a:t>2021-09-13</a:t>
+              <a:t>2021-09-15</a:t>
             </a:fld>
             <a:endParaRPr lang="ko-KR" altLang="en-US"/>
           </a:p>
@@ -834,7 +835,7 @@
           <a:p>
             <a:fld id="{14627BA5-89F0-4976-B806-5D98EF5704F2}" type="datetimeFigureOut">
               <a:rPr lang="ko-KR" altLang="en-US" smtClean="0"/>
-              <a:t>2021-09-13</a:t>
+              <a:t>2021-09-15</a:t>
             </a:fld>
             <a:endParaRPr lang="ko-KR" altLang="en-US"/>
           </a:p>
@@ -1042,7 +1043,7 @@
           <a:p>
             <a:fld id="{14627BA5-89F0-4976-B806-5D98EF5704F2}" type="datetimeFigureOut">
               <a:rPr lang="ko-KR" altLang="en-US" smtClean="0"/>
-              <a:t>2021-09-13</a:t>
+              <a:t>2021-09-15</a:t>
             </a:fld>
             <a:endParaRPr lang="ko-KR" altLang="en-US"/>
           </a:p>
@@ -1240,7 +1241,7 @@
           <a:p>
             <a:fld id="{14627BA5-89F0-4976-B806-5D98EF5704F2}" type="datetimeFigureOut">
               <a:rPr lang="ko-KR" altLang="en-US" smtClean="0"/>
-              <a:t>2021-09-13</a:t>
+              <a:t>2021-09-15</a:t>
             </a:fld>
             <a:endParaRPr lang="ko-KR" altLang="en-US"/>
           </a:p>
@@ -1515,7 +1516,7 @@
           <a:p>
             <a:fld id="{14627BA5-89F0-4976-B806-5D98EF5704F2}" type="datetimeFigureOut">
               <a:rPr lang="ko-KR" altLang="en-US" smtClean="0"/>
-              <a:t>2021-09-13</a:t>
+              <a:t>2021-09-15</a:t>
             </a:fld>
             <a:endParaRPr lang="ko-KR" altLang="en-US"/>
           </a:p>
@@ -1780,7 +1781,7 @@
           <a:p>
             <a:fld id="{14627BA5-89F0-4976-B806-5D98EF5704F2}" type="datetimeFigureOut">
               <a:rPr lang="ko-KR" altLang="en-US" smtClean="0"/>
-              <a:t>2021-09-13</a:t>
+              <a:t>2021-09-15</a:t>
             </a:fld>
             <a:endParaRPr lang="ko-KR" altLang="en-US"/>
           </a:p>
@@ -2192,7 +2193,7 @@
           <a:p>
             <a:fld id="{14627BA5-89F0-4976-B806-5D98EF5704F2}" type="datetimeFigureOut">
               <a:rPr lang="ko-KR" altLang="en-US" smtClean="0"/>
-              <a:t>2021-09-13</a:t>
+              <a:t>2021-09-15</a:t>
             </a:fld>
             <a:endParaRPr lang="ko-KR" altLang="en-US"/>
           </a:p>
@@ -2333,7 +2334,7 @@
           <a:p>
             <a:fld id="{14627BA5-89F0-4976-B806-5D98EF5704F2}" type="datetimeFigureOut">
               <a:rPr lang="ko-KR" altLang="en-US" smtClean="0"/>
-              <a:t>2021-09-13</a:t>
+              <a:t>2021-09-15</a:t>
             </a:fld>
             <a:endParaRPr lang="ko-KR" altLang="en-US"/>
           </a:p>
@@ -2446,7 +2447,7 @@
           <a:p>
             <a:fld id="{14627BA5-89F0-4976-B806-5D98EF5704F2}" type="datetimeFigureOut">
               <a:rPr lang="ko-KR" altLang="en-US" smtClean="0"/>
-              <a:t>2021-09-13</a:t>
+              <a:t>2021-09-15</a:t>
             </a:fld>
             <a:endParaRPr lang="ko-KR" altLang="en-US"/>
           </a:p>
@@ -2757,7 +2758,7 @@
           <a:p>
             <a:fld id="{14627BA5-89F0-4976-B806-5D98EF5704F2}" type="datetimeFigureOut">
               <a:rPr lang="ko-KR" altLang="en-US" smtClean="0"/>
-              <a:t>2021-09-13</a:t>
+              <a:t>2021-09-15</a:t>
             </a:fld>
             <a:endParaRPr lang="ko-KR" altLang="en-US"/>
           </a:p>
@@ -3045,7 +3046,7 @@
           <a:p>
             <a:fld id="{14627BA5-89F0-4976-B806-5D98EF5704F2}" type="datetimeFigureOut">
               <a:rPr lang="ko-KR" altLang="en-US" smtClean="0"/>
-              <a:t>2021-09-13</a:t>
+              <a:t>2021-09-15</a:t>
             </a:fld>
             <a:endParaRPr lang="ko-KR" altLang="en-US"/>
           </a:p>
@@ -3286,7 +3287,7 @@
           <a:p>
             <a:fld id="{14627BA5-89F0-4976-B806-5D98EF5704F2}" type="datetimeFigureOut">
               <a:rPr lang="ko-KR" altLang="en-US" smtClean="0"/>
-              <a:t>2021-09-13</a:t>
+              <a:t>2021-09-15</a:t>
             </a:fld>
             <a:endParaRPr lang="ko-KR" altLang="en-US"/>
           </a:p>
@@ -3755,205 +3756,56 @@
       </p:sp>
       <p:pic>
         <p:nvPicPr>
-          <p:cNvPr id="1036" name="Picture 12" descr="Database Manage Administer - Free vector graphic on Pixabay">
-            <a:extLst>
-              <a:ext uri="{FF2B5EF4-FFF2-40B4-BE49-F238E27FC236}">
-                <a16:creationId xmlns:a16="http://schemas.microsoft.com/office/drawing/2014/main" id="{6536BA2F-920A-40F9-8843-817A2877D4F8}"/>
+          <p:cNvPr id="3" name="그림 2">
+            <a:extLst>
+              <a:ext uri="{FF2B5EF4-FFF2-40B4-BE49-F238E27FC236}">
+                <a16:creationId xmlns:a16="http://schemas.microsoft.com/office/drawing/2014/main" id="{AE590248-60B9-4E5F-82D1-341608C488D3}"/>
               </a:ext>
             </a:extLst>
           </p:cNvPr>
           <p:cNvPicPr>
-            <a:picLocks noChangeAspect="1" noChangeArrowheads="1"/>
+            <a:picLocks noChangeAspect="1"/>
           </p:cNvPicPr>
           <p:nvPr/>
         </p:nvPicPr>
         <p:blipFill>
-          <a:blip r:embed="rId3">
-            <a:extLst>
-              <a:ext uri="{28A0092B-C50C-407E-A947-70E740481C1C}">
-                <a14:useLocalDpi xmlns:a14="http://schemas.microsoft.com/office/drawing/2010/main" val="0"/>
-              </a:ext>
-            </a:extLst>
-          </a:blip>
-          <a:srcRect/>
+          <a:blip r:embed="rId3"/>
           <a:stretch>
             <a:fillRect/>
           </a:stretch>
         </p:blipFill>
-        <p:spPr bwMode="auto">
+        <p:spPr>
           <a:xfrm>
-            <a:off x="2222157" y="2766884"/>
-            <a:ext cx="1324232" cy="1324232"/>
+            <a:off x="4090707" y="666364"/>
+            <a:ext cx="4010585" cy="5525271"/>
           </a:xfrm>
           <a:prstGeom prst="rect">
             <a:avLst/>
           </a:prstGeom>
-          <a:noFill/>
-          <a:extLst>
-            <a:ext uri="{909E8E84-426E-40DD-AFC4-6F175D3DCCD1}">
-              <a14:hiddenFill xmlns:a14="http://schemas.microsoft.com/office/drawing/2010/main">
-                <a:solidFill>
-                  <a:srgbClr val="FFFFFF"/>
-                </a:solidFill>
-              </a14:hiddenFill>
-            </a:ext>
-          </a:extLst>
         </p:spPr>
       </p:pic>
-      <p:pic>
-        <p:nvPicPr>
-          <p:cNvPr id="1042" name="Picture 18" descr="Android, logo, software, technology">
-            <a:extLst>
-              <a:ext uri="{FF2B5EF4-FFF2-40B4-BE49-F238E27FC236}">
-                <a16:creationId xmlns:a16="http://schemas.microsoft.com/office/drawing/2014/main" id="{F23B3C62-AAC5-4FEA-9191-0F9D766682C5}"/>
-              </a:ext>
-            </a:extLst>
-          </p:cNvPr>
-          <p:cNvPicPr>
-            <a:picLocks noChangeAspect="1" noChangeArrowheads="1"/>
-          </p:cNvPicPr>
+      <p:sp>
+        <p:nvSpPr>
+          <p:cNvPr id="4" name="직사각형 3">
+            <a:extLst>
+              <a:ext uri="{FF2B5EF4-FFF2-40B4-BE49-F238E27FC236}">
+                <a16:creationId xmlns:a16="http://schemas.microsoft.com/office/drawing/2014/main" id="{E228601A-09E9-47A9-A82E-1429DD1A8FE8}"/>
+              </a:ext>
+            </a:extLst>
+          </p:cNvPr>
+          <p:cNvSpPr/>
           <p:nvPr/>
-        </p:nvPicPr>
-        <p:blipFill>
-          <a:blip r:embed="rId4">
-            <a:extLst>
-              <a:ext uri="{28A0092B-C50C-407E-A947-70E740481C1C}">
-                <a14:useLocalDpi xmlns:a14="http://schemas.microsoft.com/office/drawing/2010/main" val="0"/>
-              </a:ext>
-            </a:extLst>
-          </a:blip>
-          <a:srcRect/>
-          <a:stretch>
-            <a:fillRect/>
-          </a:stretch>
-        </p:blipFill>
-        <p:spPr bwMode="auto">
+        </p:nvSpPr>
+        <p:spPr>
           <a:xfrm>
-            <a:off x="8645611" y="4626577"/>
-            <a:ext cx="1324232" cy="1324232"/>
+            <a:off x="4620861" y="2119184"/>
+            <a:ext cx="1786117" cy="154459"/>
           </a:xfrm>
           <a:prstGeom prst="rect">
             <a:avLst/>
           </a:prstGeom>
-          <a:noFill/>
-          <a:extLst>
-            <a:ext uri="{909E8E84-426E-40DD-AFC4-6F175D3DCCD1}">
-              <a14:hiddenFill xmlns:a14="http://schemas.microsoft.com/office/drawing/2010/main">
-                <a:solidFill>
-                  <a:srgbClr val="FFFFFF"/>
-                </a:solidFill>
-              </a14:hiddenFill>
-            </a:ext>
-          </a:extLst>
-        </p:spPr>
-      </p:pic>
-      <p:pic>
-        <p:nvPicPr>
-          <p:cNvPr id="1046" name="Picture 22" descr="Chrome, google, browser">
-            <a:extLst>
-              <a:ext uri="{FF2B5EF4-FFF2-40B4-BE49-F238E27FC236}">
-                <a16:creationId xmlns:a16="http://schemas.microsoft.com/office/drawing/2014/main" id="{4E810CD5-4E8C-433E-9FEC-B862BFF28DED}"/>
-              </a:ext>
-            </a:extLst>
-          </p:cNvPr>
-          <p:cNvPicPr>
-            <a:picLocks noChangeAspect="1" noChangeArrowheads="1"/>
-          </p:cNvPicPr>
-          <p:nvPr/>
-        </p:nvPicPr>
-        <p:blipFill>
-          <a:blip r:embed="rId5">
-            <a:extLst>
-              <a:ext uri="{28A0092B-C50C-407E-A947-70E740481C1C}">
-                <a14:useLocalDpi xmlns:a14="http://schemas.microsoft.com/office/drawing/2010/main" val="0"/>
-              </a:ext>
-            </a:extLst>
-          </a:blip>
-          <a:srcRect/>
-          <a:stretch>
-            <a:fillRect/>
-          </a:stretch>
-        </p:blipFill>
-        <p:spPr bwMode="auto">
-          <a:xfrm>
-            <a:off x="8645611" y="907191"/>
-            <a:ext cx="1324231" cy="1324231"/>
-          </a:xfrm>
-          <a:prstGeom prst="rect">
-            <a:avLst/>
-          </a:prstGeom>
-          <a:noFill/>
-        </p:spPr>
-      </p:pic>
-      <p:pic>
-        <p:nvPicPr>
-          <p:cNvPr id="1054" name="Picture 30" descr="Circle, js, node, node js, programming, round icon">
-            <a:extLst>
-              <a:ext uri="{FF2B5EF4-FFF2-40B4-BE49-F238E27FC236}">
-                <a16:creationId xmlns:a16="http://schemas.microsoft.com/office/drawing/2014/main" id="{27594053-EF63-4A02-960E-DF7D86448C47}"/>
-              </a:ext>
-            </a:extLst>
-          </p:cNvPr>
-          <p:cNvPicPr>
-            <a:picLocks noChangeAspect="1" noChangeArrowheads="1"/>
-          </p:cNvPicPr>
-          <p:nvPr/>
-        </p:nvPicPr>
-        <p:blipFill>
-          <a:blip r:embed="rId6">
-            <a:extLst>
-              <a:ext uri="{28A0092B-C50C-407E-A947-70E740481C1C}">
-                <a14:useLocalDpi xmlns:a14="http://schemas.microsoft.com/office/drawing/2010/main" val="0"/>
-              </a:ext>
-            </a:extLst>
-          </a:blip>
-          <a:srcRect/>
-          <a:stretch>
-            <a:fillRect/>
-          </a:stretch>
-        </p:blipFill>
-        <p:spPr bwMode="auto">
-          <a:xfrm>
-            <a:off x="8645611" y="2766884"/>
-            <a:ext cx="1324232" cy="1324232"/>
-          </a:xfrm>
-          <a:prstGeom prst="rect">
-            <a:avLst/>
-          </a:prstGeom>
-          <a:noFill/>
-          <a:extLst>
-            <a:ext uri="{909E8E84-426E-40DD-AFC4-6F175D3DCCD1}">
-              <a14:hiddenFill xmlns:a14="http://schemas.microsoft.com/office/drawing/2010/main">
-                <a:solidFill>
-                  <a:srgbClr val="FFFFFF"/>
-                </a:solidFill>
-              </a14:hiddenFill>
-            </a:ext>
-          </a:extLst>
-        </p:spPr>
-      </p:pic>
-      <p:sp>
-        <p:nvSpPr>
-          <p:cNvPr id="11" name="타원 10">
-            <a:extLst>
-              <a:ext uri="{FF2B5EF4-FFF2-40B4-BE49-F238E27FC236}">
-                <a16:creationId xmlns:a16="http://schemas.microsoft.com/office/drawing/2014/main" id="{5ECEC6B7-0FCA-4CC0-B6C1-1E86F6087F6E}"/>
-              </a:ext>
-            </a:extLst>
-          </p:cNvPr>
-          <p:cNvSpPr/>
-          <p:nvPr/>
-        </p:nvSpPr>
-        <p:spPr>
-          <a:xfrm>
-            <a:off x="5433884" y="2766884"/>
-            <a:ext cx="1324232" cy="1324232"/>
-          </a:xfrm>
-          <a:prstGeom prst="ellipse">
-            <a:avLst/>
-          </a:prstGeom>
           <a:solidFill>
-            <a:srgbClr val="354168"/>
+            <a:srgbClr val="FFFFFF"/>
           </a:solidFill>
           <a:ln>
             <a:noFill/>
@@ -3986,10 +3838,10 @@
       </p:sp>
       <p:sp>
         <p:nvSpPr>
-          <p:cNvPr id="13" name="사각형: 둥근 모서리 12">
-            <a:extLst>
-              <a:ext uri="{FF2B5EF4-FFF2-40B4-BE49-F238E27FC236}">
-                <a16:creationId xmlns:a16="http://schemas.microsoft.com/office/drawing/2014/main" id="{94B3AE4C-CDA7-440A-8234-8D379E989C32}"/>
+          <p:cNvPr id="16" name="직사각형 15">
+            <a:extLst>
+              <a:ext uri="{FF2B5EF4-FFF2-40B4-BE49-F238E27FC236}">
+                <a16:creationId xmlns:a16="http://schemas.microsoft.com/office/drawing/2014/main" id="{48C81E0D-06A0-4605-8D94-F3055B4ADDD1}"/>
               </a:ext>
             </a:extLst>
           </p:cNvPr>
@@ -3998,22 +3850,17 @@
         </p:nvSpPr>
         <p:spPr>
           <a:xfrm>
-            <a:off x="5650648" y="2983648"/>
-            <a:ext cx="890704" cy="890704"/>
+            <a:off x="5309286" y="2299504"/>
+            <a:ext cx="1173892" cy="154459"/>
           </a:xfrm>
-          <a:prstGeom prst="roundRect">
+          <a:prstGeom prst="rect">
             <a:avLst/>
           </a:prstGeom>
-          <a:blipFill>
-            <a:blip r:embed="rId7"/>
-            <a:stretch>
-              <a:fillRect/>
-            </a:stretch>
-          </a:blipFill>
+          <a:solidFill>
+            <a:srgbClr val="FFFFFF"/>
+          </a:solidFill>
           <a:ln>
-            <a:solidFill>
-              <a:srgbClr val="354168"/>
-            </a:solidFill>
+            <a:noFill/>
           </a:ln>
         </p:spPr>
         <p:style>
@@ -4041,200 +3888,486 @@
           </a:p>
         </p:txBody>
       </p:sp>
-      <p:cxnSp>
-        <p:nvCxnSpPr>
-          <p:cNvPr id="18" name="직선 화살표 연결선 17">
-            <a:extLst>
-              <a:ext uri="{FF2B5EF4-FFF2-40B4-BE49-F238E27FC236}">
-                <a16:creationId xmlns:a16="http://schemas.microsoft.com/office/drawing/2014/main" id="{C29F78EC-DFB3-4317-AA51-34AAF718EE2C}"/>
-              </a:ext>
-            </a:extLst>
-          </p:cNvPr>
-          <p:cNvCxnSpPr>
-            <a:stCxn id="1036" idx="3"/>
-            <a:endCxn id="11" idx="2"/>
-          </p:cNvCxnSpPr>
+      <p:sp>
+        <p:nvSpPr>
+          <p:cNvPr id="17" name="직사각형 16">
+            <a:extLst>
+              <a:ext uri="{FF2B5EF4-FFF2-40B4-BE49-F238E27FC236}">
+                <a16:creationId xmlns:a16="http://schemas.microsoft.com/office/drawing/2014/main" id="{4C50A3C0-B5E9-4D3F-BFFA-D6F3EA3098CF}"/>
+              </a:ext>
+            </a:extLst>
+          </p:cNvPr>
+          <p:cNvSpPr/>
           <p:nvPr/>
-        </p:nvCxnSpPr>
+        </p:nvSpPr>
         <p:spPr>
           <a:xfrm>
-            <a:off x="3546389" y="3429000"/>
-            <a:ext cx="1887495" cy="0"/>
+            <a:off x="4847433" y="2475625"/>
+            <a:ext cx="1173892" cy="154459"/>
           </a:xfrm>
-          <a:prstGeom prst="straightConnector1">
+          <a:prstGeom prst="rect">
             <a:avLst/>
           </a:prstGeom>
-          <a:ln w="127000" cmpd="dbl">
-            <a:solidFill>
-              <a:schemeClr val="bg2">
-                <a:lumMod val="50000"/>
-              </a:schemeClr>
-            </a:solidFill>
-            <a:headEnd type="none"/>
-            <a:tailEnd type="none"/>
+          <a:solidFill>
+            <a:srgbClr val="FFFFFF"/>
+          </a:solidFill>
+          <a:ln>
+            <a:noFill/>
           </a:ln>
         </p:spPr>
         <p:style>
-          <a:lnRef idx="1">
-            <a:schemeClr val="accent1"/>
+          <a:lnRef idx="2">
+            <a:schemeClr val="accent1">
+              <a:shade val="50000"/>
+            </a:schemeClr>
           </a:lnRef>
-          <a:fillRef idx="0">
+          <a:fillRef idx="1">
             <a:schemeClr val="accent1"/>
           </a:fillRef>
           <a:effectRef idx="0">
             <a:schemeClr val="accent1"/>
           </a:effectRef>
           <a:fontRef idx="minor">
-            <a:schemeClr val="tx1"/>
+            <a:schemeClr val="lt1"/>
           </a:fontRef>
         </p:style>
-      </p:cxnSp>
-      <p:cxnSp>
-        <p:nvCxnSpPr>
-          <p:cNvPr id="24" name="연결선: 꺾임 23">
-            <a:extLst>
-              <a:ext uri="{FF2B5EF4-FFF2-40B4-BE49-F238E27FC236}">
-                <a16:creationId xmlns:a16="http://schemas.microsoft.com/office/drawing/2014/main" id="{783FD45D-8162-419D-ACF5-4B31E3D5369D}"/>
-              </a:ext>
-            </a:extLst>
-          </p:cNvPr>
-          <p:cNvCxnSpPr>
-            <a:stCxn id="11" idx="6"/>
-            <a:endCxn id="1046" idx="1"/>
-          </p:cNvCxnSpPr>
+        <p:txBody>
+          <a:bodyPr rtlCol="0" anchor="ctr"/>
+          <a:lstStyle/>
+          <a:p>
+            <a:pPr algn="ctr"/>
+            <a:endParaRPr lang="ko-KR" altLang="en-US"/>
+          </a:p>
+        </p:txBody>
+      </p:sp>
+      <p:sp>
+        <p:nvSpPr>
+          <p:cNvPr id="19" name="직사각형 18">
+            <a:extLst>
+              <a:ext uri="{FF2B5EF4-FFF2-40B4-BE49-F238E27FC236}">
+                <a16:creationId xmlns:a16="http://schemas.microsoft.com/office/drawing/2014/main" id="{1682E04A-E2EB-4F06-ACD0-3EDEF65F26A0}"/>
+              </a:ext>
+            </a:extLst>
+          </p:cNvPr>
+          <p:cNvSpPr/>
           <p:nvPr/>
-        </p:nvCxnSpPr>
+        </p:nvSpPr>
         <p:spPr>
-          <a:xfrm flipV="1">
-            <a:off x="6758116" y="1569307"/>
-            <a:ext cx="1887495" cy="1859693"/>
+          <a:xfrm>
+            <a:off x="5413439" y="1375589"/>
+            <a:ext cx="1062759" cy="154459"/>
           </a:xfrm>
-          <a:prstGeom prst="bentConnector3">
+          <a:prstGeom prst="rect">
             <a:avLst/>
           </a:prstGeom>
-          <a:ln w="127000" cmpd="dbl">
-            <a:solidFill>
-              <a:schemeClr val="bg2">
-                <a:lumMod val="50000"/>
-              </a:schemeClr>
-            </a:solidFill>
+          <a:solidFill>
+            <a:srgbClr val="FFFFFF"/>
+          </a:solidFill>
+          <a:ln>
+            <a:noFill/>
           </a:ln>
         </p:spPr>
         <p:style>
-          <a:lnRef idx="1">
-            <a:schemeClr val="accent1"/>
+          <a:lnRef idx="2">
+            <a:schemeClr val="accent1">
+              <a:shade val="50000"/>
+            </a:schemeClr>
           </a:lnRef>
-          <a:fillRef idx="0">
+          <a:fillRef idx="1">
             <a:schemeClr val="accent1"/>
           </a:fillRef>
           <a:effectRef idx="0">
             <a:schemeClr val="accent1"/>
           </a:effectRef>
           <a:fontRef idx="minor">
-            <a:schemeClr val="tx1"/>
+            <a:schemeClr val="lt1"/>
           </a:fontRef>
         </p:style>
-      </p:cxnSp>
-      <p:cxnSp>
-        <p:nvCxnSpPr>
-          <p:cNvPr id="43" name="연결선: 꺾임 42">
-            <a:extLst>
-              <a:ext uri="{FF2B5EF4-FFF2-40B4-BE49-F238E27FC236}">
-                <a16:creationId xmlns:a16="http://schemas.microsoft.com/office/drawing/2014/main" id="{6AC818E0-903B-495B-80AD-3C1A2CF24BE9}"/>
-              </a:ext>
-            </a:extLst>
-          </p:cNvPr>
-          <p:cNvCxnSpPr>
-            <a:cxnSpLocks/>
-            <a:stCxn id="11" idx="6"/>
-            <a:endCxn id="1042" idx="1"/>
-          </p:cNvCxnSpPr>
+        <p:txBody>
+          <a:bodyPr rtlCol="0" anchor="ctr"/>
+          <a:lstStyle/>
+          <a:p>
+            <a:pPr algn="ctr"/>
+            <a:endParaRPr lang="ko-KR" altLang="en-US"/>
+          </a:p>
+        </p:txBody>
+      </p:sp>
+    </p:spTree>
+    <p:extLst>
+      <p:ext uri="{BB962C8B-B14F-4D97-AF65-F5344CB8AC3E}">
+        <p14:creationId xmlns:p14="http://schemas.microsoft.com/office/powerpoint/2010/main" val="3354590982"/>
+      </p:ext>
+    </p:extLst>
+  </p:cSld>
+  <p:clrMapOvr>
+    <a:masterClrMapping/>
+  </p:clrMapOvr>
+</p:sld>
+</file>
+
+<file path=ppt/slides/slide2.xml><?xml version="1.0" encoding="utf-8"?>
+<p:sld xmlns:a="http://schemas.openxmlformats.org/drawingml/2006/main" xmlns:r="http://schemas.openxmlformats.org/officeDocument/2006/relationships" xmlns:p="http://schemas.openxmlformats.org/presentationml/2006/main">
+  <p:cSld>
+    <p:spTree>
+      <p:nvGrpSpPr>
+        <p:cNvPr id="1" name=""/>
+        <p:cNvGrpSpPr/>
+        <p:nvPr/>
+      </p:nvGrpSpPr>
+      <p:grpSpPr>
+        <a:xfrm>
+          <a:off x="0" y="0"/>
+          <a:ext cx="0" cy="0"/>
+          <a:chOff x="0" y="0"/>
+          <a:chExt cx="0" cy="0"/>
+        </a:xfrm>
+      </p:grpSpPr>
+      <p:pic>
+        <p:nvPicPr>
+          <p:cNvPr id="5" name="그림 4">
+            <a:extLst>
+              <a:ext uri="{FF2B5EF4-FFF2-40B4-BE49-F238E27FC236}">
+                <a16:creationId xmlns:a16="http://schemas.microsoft.com/office/drawing/2014/main" id="{4E19F076-C33F-418C-BB5F-C1C785AC7E90}"/>
+              </a:ext>
+            </a:extLst>
+          </p:cNvPr>
+          <p:cNvPicPr>
+            <a:picLocks noChangeAspect="1"/>
+          </p:cNvPicPr>
           <p:nvPr/>
-        </p:nvCxnSpPr>
+        </p:nvPicPr>
+        <p:blipFill>
+          <a:blip r:embed="rId2"/>
+          <a:stretch>
+            <a:fillRect/>
+          </a:stretch>
+        </p:blipFill>
         <p:spPr>
           <a:xfrm>
-            <a:off x="6758116" y="3429000"/>
-            <a:ext cx="1887495" cy="1859693"/>
+            <a:off x="1832967" y="594917"/>
+            <a:ext cx="8526065" cy="5668166"/>
           </a:xfrm>
-          <a:prstGeom prst="bentConnector3">
+          <a:prstGeom prst="rect">
             <a:avLst/>
           </a:prstGeom>
-          <a:ln w="127000" cmpd="dbl">
-            <a:solidFill>
-              <a:schemeClr val="bg2">
-                <a:lumMod val="50000"/>
-              </a:schemeClr>
-            </a:solidFill>
+        </p:spPr>
+      </p:pic>
+      <p:sp>
+        <p:nvSpPr>
+          <p:cNvPr id="6" name="직사각형 5">
+            <a:extLst>
+              <a:ext uri="{FF2B5EF4-FFF2-40B4-BE49-F238E27FC236}">
+                <a16:creationId xmlns:a16="http://schemas.microsoft.com/office/drawing/2014/main" id="{40227084-3E3C-4B13-8CBB-3FFCD7F0CFB9}"/>
+              </a:ext>
+            </a:extLst>
+          </p:cNvPr>
+          <p:cNvSpPr/>
+          <p:nvPr/>
+        </p:nvSpPr>
+        <p:spPr>
+          <a:xfrm>
+            <a:off x="3089049" y="1159204"/>
+            <a:ext cx="1062759" cy="154459"/>
+          </a:xfrm>
+          <a:prstGeom prst="rect">
+            <a:avLst/>
+          </a:prstGeom>
+          <a:solidFill>
+            <a:srgbClr val="FFFFFF"/>
+          </a:solidFill>
+          <a:ln>
+            <a:noFill/>
           </a:ln>
         </p:spPr>
         <p:style>
-          <a:lnRef idx="1">
-            <a:schemeClr val="accent1"/>
+          <a:lnRef idx="2">
+            <a:schemeClr val="accent1">
+              <a:shade val="50000"/>
+            </a:schemeClr>
           </a:lnRef>
-          <a:fillRef idx="0">
+          <a:fillRef idx="1">
             <a:schemeClr val="accent1"/>
           </a:fillRef>
           <a:effectRef idx="0">
             <a:schemeClr val="accent1"/>
           </a:effectRef>
           <a:fontRef idx="minor">
-            <a:schemeClr val="tx1"/>
+            <a:schemeClr val="lt1"/>
           </a:fontRef>
         </p:style>
-      </p:cxnSp>
-      <p:cxnSp>
-        <p:nvCxnSpPr>
-          <p:cNvPr id="38" name="직선 화살표 연결선 37">
-            <a:extLst>
-              <a:ext uri="{FF2B5EF4-FFF2-40B4-BE49-F238E27FC236}">
-                <a16:creationId xmlns:a16="http://schemas.microsoft.com/office/drawing/2014/main" id="{5ADB6428-B19A-46AE-8DC0-90EF9CF77440}"/>
-              </a:ext>
-            </a:extLst>
-          </p:cNvPr>
-          <p:cNvCxnSpPr>
-            <a:cxnSpLocks/>
-            <a:stCxn id="11" idx="6"/>
-            <a:endCxn id="1054" idx="1"/>
-          </p:cNvCxnSpPr>
+        <p:txBody>
+          <a:bodyPr rtlCol="0" anchor="ctr"/>
+          <a:lstStyle/>
+          <a:p>
+            <a:pPr algn="ctr"/>
+            <a:endParaRPr lang="ko-KR" altLang="en-US"/>
+          </a:p>
+        </p:txBody>
+      </p:sp>
+      <p:sp>
+        <p:nvSpPr>
+          <p:cNvPr id="7" name="직사각형 6">
+            <a:extLst>
+              <a:ext uri="{FF2B5EF4-FFF2-40B4-BE49-F238E27FC236}">
+                <a16:creationId xmlns:a16="http://schemas.microsoft.com/office/drawing/2014/main" id="{51587E01-A7AF-4523-9028-D20BDBE704B0}"/>
+              </a:ext>
+            </a:extLst>
+          </p:cNvPr>
+          <p:cNvSpPr/>
           <p:nvPr/>
-        </p:nvCxnSpPr>
+        </p:nvSpPr>
         <p:spPr>
           <a:xfrm>
-            <a:off x="6758116" y="3429000"/>
-            <a:ext cx="1887495" cy="0"/>
+            <a:off x="2861863" y="1423287"/>
+            <a:ext cx="1863700" cy="154459"/>
           </a:xfrm>
-          <a:prstGeom prst="straightConnector1">
+          <a:prstGeom prst="rect">
             <a:avLst/>
           </a:prstGeom>
-          <a:ln w="127000" cmpd="dbl">
-            <a:solidFill>
-              <a:schemeClr val="bg2">
-                <a:lumMod val="50000"/>
-              </a:schemeClr>
-            </a:solidFill>
-            <a:headEnd type="none"/>
-            <a:tailEnd type="none"/>
+          <a:solidFill>
+            <a:srgbClr val="FFFFFF"/>
+          </a:solidFill>
+          <a:ln>
+            <a:noFill/>
           </a:ln>
         </p:spPr>
         <p:style>
-          <a:lnRef idx="1">
-            <a:schemeClr val="accent1"/>
+          <a:lnRef idx="2">
+            <a:schemeClr val="accent1">
+              <a:shade val="50000"/>
+            </a:schemeClr>
           </a:lnRef>
-          <a:fillRef idx="0">
+          <a:fillRef idx="1">
             <a:schemeClr val="accent1"/>
           </a:fillRef>
           <a:effectRef idx="0">
             <a:schemeClr val="accent1"/>
           </a:effectRef>
           <a:fontRef idx="minor">
-            <a:schemeClr val="tx1"/>
+            <a:schemeClr val="lt1"/>
           </a:fontRef>
         </p:style>
-      </p:cxnSp>
+        <p:txBody>
+          <a:bodyPr rtlCol="0" anchor="ctr"/>
+          <a:lstStyle/>
+          <a:p>
+            <a:pPr algn="ctr"/>
+            <a:endParaRPr lang="ko-KR" altLang="en-US"/>
+          </a:p>
+        </p:txBody>
+      </p:sp>
+      <p:sp>
+        <p:nvSpPr>
+          <p:cNvPr id="8" name="직사각형 7">
+            <a:extLst>
+              <a:ext uri="{FF2B5EF4-FFF2-40B4-BE49-F238E27FC236}">
+                <a16:creationId xmlns:a16="http://schemas.microsoft.com/office/drawing/2014/main" id="{53011821-1D74-438F-B9FB-EE87399673A6}"/>
+              </a:ext>
+            </a:extLst>
+          </p:cNvPr>
+          <p:cNvSpPr/>
+          <p:nvPr/>
+        </p:nvSpPr>
+        <p:spPr>
+          <a:xfrm>
+            <a:off x="3198405" y="2790234"/>
+            <a:ext cx="1156046" cy="154459"/>
+          </a:xfrm>
+          <a:prstGeom prst="rect">
+            <a:avLst/>
+          </a:prstGeom>
+          <a:solidFill>
+            <a:srgbClr val="FFFFFF"/>
+          </a:solidFill>
+          <a:ln>
+            <a:noFill/>
+          </a:ln>
+        </p:spPr>
+        <p:style>
+          <a:lnRef idx="2">
+            <a:schemeClr val="accent1">
+              <a:shade val="50000"/>
+            </a:schemeClr>
+          </a:lnRef>
+          <a:fillRef idx="1">
+            <a:schemeClr val="accent1"/>
+          </a:fillRef>
+          <a:effectRef idx="0">
+            <a:schemeClr val="accent1"/>
+          </a:effectRef>
+          <a:fontRef idx="minor">
+            <a:schemeClr val="lt1"/>
+          </a:fontRef>
+        </p:style>
+        <p:txBody>
+          <a:bodyPr rtlCol="0" anchor="ctr"/>
+          <a:lstStyle/>
+          <a:p>
+            <a:pPr algn="ctr"/>
+            <a:endParaRPr lang="ko-KR" altLang="en-US"/>
+          </a:p>
+        </p:txBody>
+      </p:sp>
+      <p:sp>
+        <p:nvSpPr>
+          <p:cNvPr id="9" name="직사각형 8">
+            <a:extLst>
+              <a:ext uri="{FF2B5EF4-FFF2-40B4-BE49-F238E27FC236}">
+                <a16:creationId xmlns:a16="http://schemas.microsoft.com/office/drawing/2014/main" id="{BA30FDF9-FFA4-44F9-8A9F-16A82A63F41B}"/>
+              </a:ext>
+            </a:extLst>
+          </p:cNvPr>
+          <p:cNvSpPr/>
+          <p:nvPr/>
+        </p:nvSpPr>
+        <p:spPr>
+          <a:xfrm>
+            <a:off x="3678872" y="3165357"/>
+            <a:ext cx="1156046" cy="154459"/>
+          </a:xfrm>
+          <a:prstGeom prst="rect">
+            <a:avLst/>
+          </a:prstGeom>
+          <a:solidFill>
+            <a:srgbClr val="FFFFFF"/>
+          </a:solidFill>
+          <a:ln>
+            <a:noFill/>
+          </a:ln>
+        </p:spPr>
+        <p:style>
+          <a:lnRef idx="2">
+            <a:schemeClr val="accent1">
+              <a:shade val="50000"/>
+            </a:schemeClr>
+          </a:lnRef>
+          <a:fillRef idx="1">
+            <a:schemeClr val="accent1"/>
+          </a:fillRef>
+          <a:effectRef idx="0">
+            <a:schemeClr val="accent1"/>
+          </a:effectRef>
+          <a:fontRef idx="minor">
+            <a:schemeClr val="lt1"/>
+          </a:fontRef>
+        </p:style>
+        <p:txBody>
+          <a:bodyPr rtlCol="0" anchor="ctr"/>
+          <a:lstStyle/>
+          <a:p>
+            <a:pPr algn="ctr"/>
+            <a:endParaRPr lang="ko-KR" altLang="en-US"/>
+          </a:p>
+        </p:txBody>
+      </p:sp>
+      <p:sp>
+        <p:nvSpPr>
+          <p:cNvPr id="10" name="직사각형 9">
+            <a:extLst>
+              <a:ext uri="{FF2B5EF4-FFF2-40B4-BE49-F238E27FC236}">
+                <a16:creationId xmlns:a16="http://schemas.microsoft.com/office/drawing/2014/main" id="{86A16A3A-7E2C-45CA-9261-ACB37B44FBFC}"/>
+              </a:ext>
+            </a:extLst>
+          </p:cNvPr>
+          <p:cNvSpPr/>
+          <p:nvPr/>
+        </p:nvSpPr>
+        <p:spPr>
+          <a:xfrm>
+            <a:off x="2980526" y="3351770"/>
+            <a:ext cx="1767030" cy="186415"/>
+          </a:xfrm>
+          <a:prstGeom prst="rect">
+            <a:avLst/>
+          </a:prstGeom>
+          <a:solidFill>
+            <a:srgbClr val="FFFFFF"/>
+          </a:solidFill>
+          <a:ln>
+            <a:noFill/>
+          </a:ln>
+        </p:spPr>
+        <p:style>
+          <a:lnRef idx="2">
+            <a:schemeClr val="accent1">
+              <a:shade val="50000"/>
+            </a:schemeClr>
+          </a:lnRef>
+          <a:fillRef idx="1">
+            <a:schemeClr val="accent1"/>
+          </a:fillRef>
+          <a:effectRef idx="0">
+            <a:schemeClr val="accent1"/>
+          </a:effectRef>
+          <a:fontRef idx="minor">
+            <a:schemeClr val="lt1"/>
+          </a:fontRef>
+        </p:style>
+        <p:txBody>
+          <a:bodyPr rtlCol="0" anchor="ctr"/>
+          <a:lstStyle/>
+          <a:p>
+            <a:pPr algn="ctr"/>
+            <a:endParaRPr lang="ko-KR" altLang="en-US"/>
+          </a:p>
+        </p:txBody>
+      </p:sp>
+      <p:sp>
+        <p:nvSpPr>
+          <p:cNvPr id="11" name="직사각형 10">
+            <a:extLst>
+              <a:ext uri="{FF2B5EF4-FFF2-40B4-BE49-F238E27FC236}">
+                <a16:creationId xmlns:a16="http://schemas.microsoft.com/office/drawing/2014/main" id="{7481B3F9-D0A6-4C30-A980-0D40767256DD}"/>
+              </a:ext>
+            </a:extLst>
+          </p:cNvPr>
+          <p:cNvSpPr/>
+          <p:nvPr/>
+        </p:nvSpPr>
+        <p:spPr>
+          <a:xfrm>
+            <a:off x="7524937" y="2790233"/>
+            <a:ext cx="579020" cy="715996"/>
+          </a:xfrm>
+          <a:prstGeom prst="rect">
+            <a:avLst/>
+          </a:prstGeom>
+          <a:solidFill>
+            <a:srgbClr val="FFFFFF"/>
+          </a:solidFill>
+          <a:ln>
+            <a:noFill/>
+          </a:ln>
+        </p:spPr>
+        <p:style>
+          <a:lnRef idx="2">
+            <a:schemeClr val="accent1">
+              <a:shade val="50000"/>
+            </a:schemeClr>
+          </a:lnRef>
+          <a:fillRef idx="1">
+            <a:schemeClr val="accent1"/>
+          </a:fillRef>
+          <a:effectRef idx="0">
+            <a:schemeClr val="accent1"/>
+          </a:effectRef>
+          <a:fontRef idx="minor">
+            <a:schemeClr val="lt1"/>
+          </a:fontRef>
+        </p:style>
+        <p:txBody>
+          <a:bodyPr rtlCol="0" anchor="ctr"/>
+          <a:lstStyle/>
+          <a:p>
+            <a:pPr algn="ctr"/>
+            <a:endParaRPr lang="ko-KR" altLang="en-US"/>
+          </a:p>
+        </p:txBody>
+      </p:sp>
     </p:spTree>
     <p:extLst>
       <p:ext uri="{BB962C8B-B14F-4D97-AF65-F5344CB8AC3E}">
-        <p14:creationId xmlns:p14="http://schemas.microsoft.com/office/powerpoint/2010/main" val="3354590982"/>
+        <p14:creationId xmlns:p14="http://schemas.microsoft.com/office/powerpoint/2010/main" val="211615195"/>
       </p:ext>
     </p:extLst>
   </p:cSld>

</xml_diff>